<commit_message>
Add master file that combines all chapters
</commit_message>
<xml_diff>
--- a/export/ch4-mysql-sqli-prevention.pptx
+++ b/export/ch4-mysql-sqli-prevention.pptx
@@ -160,6 +160,35 @@
     </p:ext>
   </p:extLst>
 </p:presentation>
+</file>
+
+<file path=ppt/changesInfos/changesInfo1.xml><?xml version="1.0" encoding="utf-8"?>
+<pc:chgInfo xmlns:a="http://schemas.openxmlformats.org/drawingml/2006/main" xmlns:r="http://schemas.openxmlformats.org/officeDocument/2006/relationships" xmlns:ac="http://schemas.microsoft.com/office/drawing/2013/main/command" xmlns:pc="http://schemas.microsoft.com/office/powerpoint/2013/main/command">
+  <pc:docChgLst>
+    <pc:chgData name="Still Hsu" userId="4ca04788c324ab33" providerId="LiveId" clId="{892CD733-376F-41E3-89A6-4027580C2C4B}"/>
+    <pc:docChg chg="modSld">
+      <pc:chgData name="Still Hsu" userId="4ca04788c324ab33" providerId="LiveId" clId="{892CD733-376F-41E3-89A6-4027580C2C4B}" dt="2019-10-25T04:42:04.336" v="0" actId="113"/>
+      <pc:docMkLst>
+        <pc:docMk/>
+      </pc:docMkLst>
+      <pc:sldChg chg="modSp mod">
+        <pc:chgData name="Still Hsu" userId="4ca04788c324ab33" providerId="LiveId" clId="{892CD733-376F-41E3-89A6-4027580C2C4B}" dt="2019-10-25T04:42:04.336" v="0" actId="113"/>
+        <pc:sldMkLst>
+          <pc:docMk/>
+          <pc:sldMk cId="0" sldId="257"/>
+        </pc:sldMkLst>
+        <pc:spChg chg="mod">
+          <ac:chgData name="Still Hsu" userId="4ca04788c324ab33" providerId="LiveId" clId="{892CD733-376F-41E3-89A6-4027580C2C4B}" dt="2019-10-25T04:42:04.336" v="0" actId="113"/>
+          <ac:spMkLst>
+            <pc:docMk/>
+            <pc:sldMk cId="0" sldId="257"/>
+            <ac:spMk id="8" creationId="{68924AEB-36F3-439A-B386-220C267B7A0C}"/>
+          </ac:spMkLst>
+        </pc:spChg>
+      </pc:sldChg>
+    </pc:docChg>
+  </pc:docChgLst>
+</pc:chgInfo>
 </file>
 
 <file path=ppt/slideLayouts/slideLayout1.xml><?xml version="1.0" encoding="utf-8"?>
@@ -8609,7 +8638,7 @@
           <a:p>
             <a:pPr lvl="1"/>
             <a:r>
-              <a:rPr b="1" dirty="0" err="1">
+              <a:rPr dirty="0" err="1">
                 <a:hlinkClick r:id="rId4" action="ppaction://hlinksldjump"/>
               </a:rPr>
               <a:t>參數化查詢</a:t>
@@ -8621,19 +8650,16 @@
           <a:p>
             <a:pPr lvl="1"/>
             <a:r>
-              <a:rPr lang="zh-TW" altLang="en-US" b="1" dirty="0">
+              <a:rPr lang="zh-TW" altLang="en-US" dirty="0">
                 <a:hlinkClick r:id="rId5" action="ppaction://hlinksldjump"/>
               </a:rPr>
               <a:t>資料驗證</a:t>
             </a:r>
-            <a:endParaRPr lang="zh-TW" altLang="en-US" dirty="0">
-              <a:hlinkClick r:id="rId5" action="ppaction://hlinksldjump"/>
-            </a:endParaRPr>
           </a:p>
           <a:p>
             <a:pPr lvl="1"/>
             <a:r>
-              <a:rPr b="1" dirty="0">
+              <a:rPr dirty="0">
                 <a:hlinkClick r:id="rId6" action="ppaction://hlinksldjump"/>
               </a:rPr>
               <a:t>ORM</a:t>

</xml_diff>